<commit_message>
Modulo 5 - Teoria y resumenes
</commit_message>
<xml_diff>
--- a/modulo5/Modulo 5 - Filminas Repaso.pptx
+++ b/modulo5/Modulo 5 - Filminas Repaso.pptx
@@ -5,10 +5,10 @@
     <p:sldMasterId id="2147483672" r:id="rId1"/>
   </p:sldMasterIdLst>
   <p:notesMasterIdLst>
-    <p:notesMasterId r:id="rId38"/>
+    <p:notesMasterId r:id="rId44"/>
   </p:notesMasterIdLst>
   <p:handoutMasterIdLst>
-    <p:handoutMasterId r:id="rId39"/>
+    <p:handoutMasterId r:id="rId45"/>
   </p:handoutMasterIdLst>
   <p:sldIdLst>
     <p:sldId id="278" r:id="rId2"/>
@@ -47,23 +47,29 @@
     <p:sldId id="293" r:id="rId35"/>
     <p:sldId id="294" r:id="rId36"/>
     <p:sldId id="295" r:id="rId37"/>
+    <p:sldId id="296" r:id="rId38"/>
+    <p:sldId id="297" r:id="rId39"/>
+    <p:sldId id="298" r:id="rId40"/>
+    <p:sldId id="299" r:id="rId41"/>
+    <p:sldId id="300" r:id="rId42"/>
+    <p:sldId id="301" r:id="rId43"/>
   </p:sldIdLst>
   <p:sldSz cx="9144000" cy="6858000" type="screen4x3"/>
-  <p:notesSz cx="6669088" cy="9926638"/>
+  <p:notesSz cx="6797675" cy="9926638"/>
   <p:embeddedFontLst>
     <p:embeddedFont>
       <p:font typeface="Calibri" panose="020F0502020204030204" pitchFamily="34" charset="0"/>
-      <p:regular r:id="rId40"/>
-      <p:bold r:id="rId41"/>
-      <p:italic r:id="rId42"/>
-      <p:boldItalic r:id="rId43"/>
+      <p:regular r:id="rId46"/>
+      <p:bold r:id="rId47"/>
+      <p:italic r:id="rId48"/>
+      <p:boldItalic r:id="rId49"/>
     </p:embeddedFont>
     <p:embeddedFont>
       <p:font typeface="Proxima Nova" panose="020B0604020202020204" charset="0"/>
-      <p:regular r:id="rId44"/>
-      <p:bold r:id="rId45"/>
-      <p:italic r:id="rId46"/>
-      <p:boldItalic r:id="rId47"/>
+      <p:regular r:id="rId50"/>
+      <p:bold r:id="rId51"/>
+      <p:italic r:id="rId52"/>
+      <p:boldItalic r:id="rId53"/>
     </p:embeddedFont>
   </p:embeddedFontLst>
   <p:defaultTextStyle>
@@ -317,7 +323,7 @@
             <a:srgbClr val="000000"/>
           </p15:clr>
         </p15:guide>
-        <p15:guide id="2" pos="2101" userDrawn="1">
+        <p15:guide id="2" pos="2142" userDrawn="1">
           <p15:clr>
             <a:srgbClr val="000000"/>
           </p15:clr>
@@ -326,10 +332,6 @@
     </p:ext>
   </p:extLst>
 </p:presentation>
-</file>
-
-<file path=ppt/revisionInfo.xml><?xml version="1.0" encoding="utf-8"?>
-<p1510:revInfo xmlns:a="http://schemas.openxmlformats.org/drawingml/2006/main" xmlns:r="http://schemas.openxmlformats.org/officeDocument/2006/relationships" xmlns:p1510="http://schemas.microsoft.com/office/powerpoint/2015/10/main"/>
 </file>
 
 <file path=ppt/handoutMasters/handoutMaster1.xml><?xml version="1.0" encoding="utf-8"?>
@@ -373,7 +375,7 @@
         <p:spPr>
           <a:xfrm>
             <a:off x="0" y="0"/>
-            <a:ext cx="2889938" cy="498056"/>
+            <a:ext cx="2945659" cy="498056"/>
           </a:xfrm>
           <a:prstGeom prst="rect">
             <a:avLst/>
@@ -412,8 +414,8 @@
         </p:nvSpPr>
         <p:spPr>
           <a:xfrm>
-            <a:off x="3777607" y="0"/>
-            <a:ext cx="2889938" cy="498056"/>
+            <a:off x="3850443" y="0"/>
+            <a:ext cx="2945659" cy="498056"/>
           </a:xfrm>
           <a:prstGeom prst="rect">
             <a:avLst/>
@@ -429,7 +431,7 @@
           <a:p>
             <a:fld id="{14872144-6C84-4B85-ACA2-95A058CD7635}" type="datetimeFigureOut">
               <a:rPr lang="es-AR" smtClean="0"/>
-              <a:t>14/10/2019</a:t>
+              <a:t>28/10/2019</a:t>
             </a:fld>
             <a:endParaRPr lang="es-AR"/>
           </a:p>
@@ -453,8 +455,8 @@
         </p:nvSpPr>
         <p:spPr>
           <a:xfrm>
-            <a:off x="0" y="9428584"/>
-            <a:ext cx="2889938" cy="498055"/>
+            <a:off x="0" y="9428585"/>
+            <a:ext cx="2945659" cy="498055"/>
           </a:xfrm>
           <a:prstGeom prst="rect">
             <a:avLst/>
@@ -493,8 +495,8 @@
         </p:nvSpPr>
         <p:spPr>
           <a:xfrm>
-            <a:off x="3777607" y="9428584"/>
-            <a:ext cx="2889938" cy="498055"/>
+            <a:off x="3850443" y="9428585"/>
+            <a:ext cx="2945659" cy="498055"/>
           </a:xfrm>
           <a:prstGeom prst="rect">
             <a:avLst/>
@@ -562,7 +564,7 @@
         <p:spPr>
           <a:xfrm>
             <a:off x="0" y="0"/>
-            <a:ext cx="6669088" cy="9926638"/>
+            <a:ext cx="6797675" cy="9926638"/>
           </a:xfrm>
           <a:prstGeom prst="roundRect">
             <a:avLst>
@@ -614,8 +616,8 @@
         </p:nvSpPr>
         <p:spPr>
           <a:xfrm>
-            <a:off x="0" y="0"/>
-            <a:ext cx="2889938" cy="498055"/>
+            <a:off x="0" y="1"/>
+            <a:ext cx="2945659" cy="498055"/>
           </a:xfrm>
           <a:prstGeom prst="rect">
             <a:avLst/>
@@ -667,8 +669,8 @@
         </p:nvSpPr>
         <p:spPr>
           <a:xfrm>
-            <a:off x="3777606" y="0"/>
-            <a:ext cx="2888394" cy="496332"/>
+            <a:off x="3850442" y="0"/>
+            <a:ext cx="2944085" cy="496332"/>
           </a:xfrm>
           <a:prstGeom prst="rect">
             <a:avLst/>
@@ -899,8 +901,8 @@
         </p:nvSpPr>
         <p:spPr>
           <a:xfrm>
-            <a:off x="1101725" y="1241425"/>
-            <a:ext cx="4464050" cy="3348038"/>
+            <a:off x="1165225" y="1241425"/>
+            <a:ext cx="4465638" cy="3348038"/>
           </a:xfrm>
           <a:custGeom>
             <a:avLst/>
@@ -950,8 +952,8 @@
         </p:nvSpPr>
         <p:spPr>
           <a:xfrm>
-            <a:off x="666909" y="4777194"/>
-            <a:ext cx="5333726" cy="3906890"/>
+            <a:off x="679768" y="4777194"/>
+            <a:ext cx="5436566" cy="3906890"/>
           </a:xfrm>
           <a:prstGeom prst="rect">
             <a:avLst/>
@@ -1079,8 +1081,8 @@
         </p:nvSpPr>
         <p:spPr>
           <a:xfrm>
-            <a:off x="0" y="9428583"/>
-            <a:ext cx="2889938" cy="498055"/>
+            <a:off x="0" y="9428584"/>
+            <a:ext cx="2945659" cy="498055"/>
           </a:xfrm>
           <a:prstGeom prst="rect">
             <a:avLst/>
@@ -1132,8 +1134,8 @@
         </p:nvSpPr>
         <p:spPr>
           <a:xfrm>
-            <a:off x="3777606" y="9428582"/>
-            <a:ext cx="2888394" cy="496332"/>
+            <a:off x="3850442" y="9428582"/>
+            <a:ext cx="2944085" cy="496332"/>
           </a:xfrm>
           <a:prstGeom prst="rect">
             <a:avLst/>
@@ -1447,8 +1449,8 @@
         </p:nvSpPr>
         <p:spPr>
           <a:xfrm>
-            <a:off x="854075" y="744538"/>
-            <a:ext cx="4960938" cy="3722687"/>
+            <a:off x="917575" y="744538"/>
+            <a:ext cx="4962525" cy="3722687"/>
           </a:xfrm>
           <a:custGeom>
             <a:avLst/>
@@ -1488,8 +1490,8 @@
         </p:nvSpPr>
         <p:spPr>
           <a:xfrm>
-            <a:off x="666909" y="4715153"/>
-            <a:ext cx="5335270" cy="4466987"/>
+            <a:off x="679768" y="4715154"/>
+            <a:ext cx="5438140" cy="4466987"/>
           </a:xfrm>
           <a:prstGeom prst="rect">
             <a:avLst/>
@@ -1581,8 +1583,8 @@
         </p:nvSpPr>
         <p:spPr>
           <a:xfrm>
-            <a:off x="1101725" y="1241425"/>
-            <a:ext cx="4465638" cy="3349625"/>
+            <a:off x="1165225" y="1241425"/>
+            <a:ext cx="4467225" cy="3349625"/>
           </a:xfrm>
           <a:custGeom>
             <a:avLst/>
@@ -1632,8 +1634,8 @@
         </p:nvSpPr>
         <p:spPr>
           <a:xfrm>
-            <a:off x="666909" y="4777194"/>
-            <a:ext cx="5335270" cy="3908614"/>
+            <a:off x="679768" y="4777194"/>
+            <a:ext cx="5438140" cy="3908614"/>
           </a:xfrm>
           <a:prstGeom prst="rect">
             <a:avLst/>
@@ -1674,8 +1676,8 @@
         </p:nvSpPr>
         <p:spPr>
           <a:xfrm>
-            <a:off x="3777607" y="9428584"/>
-            <a:ext cx="2889938" cy="498055"/>
+            <a:off x="3850443" y="9428585"/>
+            <a:ext cx="2945659" cy="498055"/>
           </a:xfrm>
           <a:prstGeom prst="rect">
             <a:avLst/>
@@ -1775,8 +1777,8 @@
         </p:nvSpPr>
         <p:spPr>
           <a:xfrm>
-            <a:off x="666909" y="4777194"/>
-            <a:ext cx="5335270" cy="3908614"/>
+            <a:off x="679768" y="4777194"/>
+            <a:ext cx="5438140" cy="3908614"/>
           </a:xfrm>
           <a:prstGeom prst="rect">
             <a:avLst/>
@@ -1813,8 +1815,8 @@
         </p:nvSpPr>
         <p:spPr>
           <a:xfrm>
-            <a:off x="1101725" y="1241425"/>
-            <a:ext cx="4465638" cy="3349625"/>
+            <a:off x="1165225" y="1241425"/>
+            <a:ext cx="4467225" cy="3349625"/>
           </a:xfrm>
           <a:custGeom>
             <a:avLst/>
@@ -1909,8 +1911,8 @@
         </p:nvSpPr>
         <p:spPr>
           <a:xfrm>
-            <a:off x="666909" y="4777194"/>
-            <a:ext cx="5335270" cy="3908614"/>
+            <a:off x="679768" y="4777194"/>
+            <a:ext cx="5438140" cy="3908614"/>
           </a:xfrm>
           <a:prstGeom prst="rect">
             <a:avLst/>
@@ -1947,8 +1949,8 @@
         </p:nvSpPr>
         <p:spPr>
           <a:xfrm>
-            <a:off x="1101725" y="1241425"/>
-            <a:ext cx="4465638" cy="3349625"/>
+            <a:off x="1165225" y="1241425"/>
+            <a:ext cx="4467225" cy="3349625"/>
           </a:xfrm>
           <a:custGeom>
             <a:avLst/>
@@ -2043,8 +2045,8 @@
         </p:nvSpPr>
         <p:spPr>
           <a:xfrm>
-            <a:off x="666909" y="4777194"/>
-            <a:ext cx="5335270" cy="3908614"/>
+            <a:off x="679768" y="4777194"/>
+            <a:ext cx="5438140" cy="3908614"/>
           </a:xfrm>
           <a:prstGeom prst="rect">
             <a:avLst/>
@@ -2081,8 +2083,8 @@
         </p:nvSpPr>
         <p:spPr>
           <a:xfrm>
-            <a:off x="1101725" y="1241425"/>
-            <a:ext cx="4465638" cy="3349625"/>
+            <a:off x="1165225" y="1241425"/>
+            <a:ext cx="4467225" cy="3349625"/>
           </a:xfrm>
           <a:custGeom>
             <a:avLst/>
@@ -2148,6 +2150,134 @@
 </p:notes>
 </file>
 
+<file path=ppt/notesSlides/notesSlide14.xml><?xml version="1.0" encoding="utf-8"?>
+<p:notes xmlns:a="http://schemas.openxmlformats.org/drawingml/2006/main" xmlns:r="http://schemas.openxmlformats.org/officeDocument/2006/relationships" xmlns:p="http://schemas.openxmlformats.org/presentationml/2006/main">
+  <p:cSld>
+    <p:spTree>
+      <p:nvGrpSpPr>
+        <p:cNvPr id="1" name=""/>
+        <p:cNvGrpSpPr/>
+        <p:nvPr/>
+      </p:nvGrpSpPr>
+      <p:grpSpPr>
+        <a:xfrm>
+          <a:off x="0" y="0"/>
+          <a:ext cx="0" cy="0"/>
+          <a:chOff x="0" y="0"/>
+          <a:chExt cx="0" cy="0"/>
+        </a:xfrm>
+      </p:grpSpPr>
+      <p:sp>
+        <p:nvSpPr>
+          <p:cNvPr id="2" name="Marcador de imagen de diapositiva 1"/>
+          <p:cNvSpPr>
+            <a:spLocks noGrp="1" noRot="1" noChangeAspect="1"/>
+          </p:cNvSpPr>
+          <p:nvPr>
+            <p:ph type="sldImg"/>
+          </p:nvPr>
+        </p:nvSpPr>
+        <p:spPr/>
+      </p:sp>
+      <p:sp>
+        <p:nvSpPr>
+          <p:cNvPr id="3" name="Marcador de notas 2"/>
+          <p:cNvSpPr>
+            <a:spLocks noGrp="1"/>
+          </p:cNvSpPr>
+          <p:nvPr>
+            <p:ph type="body" idx="1"/>
+          </p:nvPr>
+        </p:nvSpPr>
+        <p:spPr/>
+        <p:txBody>
+          <a:bodyPr/>
+          <a:lstStyle/>
+          <a:p>
+            <a:endParaRPr lang="es-AR" dirty="0"/>
+          </a:p>
+        </p:txBody>
+      </p:sp>
+      <p:sp>
+        <p:nvSpPr>
+          <p:cNvPr id="4" name="Marcador de fecha 3"/>
+          <p:cNvSpPr>
+            <a:spLocks noGrp="1"/>
+          </p:cNvSpPr>
+          <p:nvPr>
+            <p:ph type="dt" idx="10"/>
+          </p:nvPr>
+        </p:nvSpPr>
+        <p:spPr/>
+        <p:txBody>
+          <a:bodyPr/>
+          <a:lstStyle/>
+          <a:p>
+            <a:endParaRPr lang="es-AR"/>
+          </a:p>
+        </p:txBody>
+      </p:sp>
+      <p:sp>
+        <p:nvSpPr>
+          <p:cNvPr id="5" name="Marcador de número de diapositiva 4"/>
+          <p:cNvSpPr>
+            <a:spLocks noGrp="1"/>
+          </p:cNvSpPr>
+          <p:nvPr>
+            <p:ph type="sldNum" idx="12"/>
+          </p:nvPr>
+        </p:nvSpPr>
+        <p:spPr/>
+        <p:txBody>
+          <a:bodyPr/>
+          <a:lstStyle/>
+          <a:p>
+            <a:pPr marL="215900" marR="0" lvl="0" indent="0" algn="r" rtl="0">
+              <a:lnSpc>
+                <a:spcPct val="100000"/>
+              </a:lnSpc>
+              <a:spcBef>
+                <a:spcPts val="0"/>
+              </a:spcBef>
+              <a:spcAft>
+                <a:spcPts val="0"/>
+              </a:spcAft>
+              <a:buClr>
+                <a:srgbClr val="000000"/>
+              </a:buClr>
+              <a:buSzPts val="1200"/>
+              <a:buFont typeface="Times New Roman"/>
+              <a:buNone/>
+            </a:pPr>
+            <a:fld id="{00000000-1234-1234-1234-123412341234}" type="slidenum">
+              <a:rPr lang="en-US" sz="1200" b="0" i="0" u="none" smtClean="0">
+                <a:solidFill>
+                  <a:srgbClr val="000000"/>
+                </a:solidFill>
+                <a:latin typeface="Times New Roman"/>
+                <a:ea typeface="Times New Roman"/>
+                <a:cs typeface="Times New Roman"/>
+                <a:sym typeface="Times New Roman"/>
+              </a:rPr>
+              <a:t>42</a:t>
+            </a:fld>
+            <a:endParaRPr lang="en-US"/>
+          </a:p>
+        </p:txBody>
+      </p:sp>
+    </p:spTree>
+    <p:extLst>
+      <p:ext uri="{BB962C8B-B14F-4D97-AF65-F5344CB8AC3E}">
+        <p14:creationId xmlns:p14="http://schemas.microsoft.com/office/powerpoint/2010/main" val="3945829992"/>
+      </p:ext>
+    </p:extLst>
+  </p:cSld>
+  <p:clrMapOvr>
+    <a:masterClrMapping/>
+  </p:clrMapOvr>
+</p:notes>
+</file>
+
 <file path=ppt/notesSlides/notesSlide2.xml><?xml version="1.0" encoding="utf-8"?>
 <p:notes xmlns:a="http://schemas.openxmlformats.org/drawingml/2006/main" xmlns:r="http://schemas.openxmlformats.org/officeDocument/2006/relationships" xmlns:p="http://schemas.openxmlformats.org/presentationml/2006/main" showMasterSp="0" showMasterPhAnim="0">
   <p:cSld>
@@ -2173,8 +2303,8 @@
         </p:nvSpPr>
         <p:spPr>
           <a:xfrm>
-            <a:off x="3777606" y="9428582"/>
-            <a:ext cx="2888394" cy="496332"/>
+            <a:off x="3850442" y="9428582"/>
+            <a:ext cx="2944085" cy="496332"/>
           </a:xfrm>
           <a:prstGeom prst="rect">
             <a:avLst/>
@@ -2235,8 +2365,8 @@
         </p:nvSpPr>
         <p:spPr>
           <a:xfrm>
-            <a:off x="1101725" y="1241425"/>
-            <a:ext cx="4465638" cy="3349625"/>
+            <a:off x="1165225" y="1241425"/>
+            <a:ext cx="4467225" cy="3349625"/>
           </a:xfrm>
           <a:custGeom>
             <a:avLst/>
@@ -2282,8 +2412,8 @@
         </p:nvSpPr>
         <p:spPr>
           <a:xfrm>
-            <a:off x="666909" y="4777194"/>
-            <a:ext cx="5335270" cy="3908614"/>
+            <a:off x="679768" y="4777194"/>
+            <a:ext cx="5438140" cy="3908614"/>
           </a:xfrm>
           <a:prstGeom prst="rect">
             <a:avLst/>
@@ -2375,8 +2505,8 @@
         </p:nvSpPr>
         <p:spPr>
           <a:xfrm>
-            <a:off x="3777606" y="9428582"/>
-            <a:ext cx="2888394" cy="496332"/>
+            <a:off x="3850442" y="9428582"/>
+            <a:ext cx="2944085" cy="496332"/>
           </a:xfrm>
           <a:prstGeom prst="rect">
             <a:avLst/>
@@ -2437,8 +2567,8 @@
         </p:nvSpPr>
         <p:spPr>
           <a:xfrm>
-            <a:off x="1101725" y="1241425"/>
-            <a:ext cx="4465638" cy="3349625"/>
+            <a:off x="1165225" y="1241425"/>
+            <a:ext cx="4467225" cy="3349625"/>
           </a:xfrm>
           <a:custGeom>
             <a:avLst/>
@@ -2484,8 +2614,8 @@
         </p:nvSpPr>
         <p:spPr>
           <a:xfrm>
-            <a:off x="666909" y="4777194"/>
-            <a:ext cx="5335270" cy="3908614"/>
+            <a:off x="679768" y="4777194"/>
+            <a:ext cx="5438140" cy="3908614"/>
           </a:xfrm>
           <a:prstGeom prst="rect">
             <a:avLst/>
@@ -2577,8 +2707,8 @@
         </p:nvSpPr>
         <p:spPr>
           <a:xfrm>
-            <a:off x="3777606" y="9428582"/>
-            <a:ext cx="2888394" cy="496332"/>
+            <a:off x="3850442" y="9428582"/>
+            <a:ext cx="2944085" cy="496332"/>
           </a:xfrm>
           <a:prstGeom prst="rect">
             <a:avLst/>
@@ -2639,8 +2769,8 @@
         </p:nvSpPr>
         <p:spPr>
           <a:xfrm>
-            <a:off x="1101725" y="1241425"/>
-            <a:ext cx="4465638" cy="3349625"/>
+            <a:off x="1165225" y="1241425"/>
+            <a:ext cx="4467225" cy="3349625"/>
           </a:xfrm>
           <a:custGeom>
             <a:avLst/>
@@ -2686,8 +2816,8 @@
         </p:nvSpPr>
         <p:spPr>
           <a:xfrm>
-            <a:off x="666909" y="4777194"/>
-            <a:ext cx="5335270" cy="3908614"/>
+            <a:off x="679768" y="4777194"/>
+            <a:ext cx="5438140" cy="3908614"/>
           </a:xfrm>
           <a:prstGeom prst="rect">
             <a:avLst/>
@@ -2779,8 +2909,8 @@
         </p:nvSpPr>
         <p:spPr>
           <a:xfrm>
-            <a:off x="3777606" y="9428582"/>
-            <a:ext cx="2888394" cy="496332"/>
+            <a:off x="3850442" y="9428582"/>
+            <a:ext cx="2944085" cy="496332"/>
           </a:xfrm>
           <a:prstGeom prst="rect">
             <a:avLst/>
@@ -2841,8 +2971,8 @@
         </p:nvSpPr>
         <p:spPr>
           <a:xfrm>
-            <a:off x="1101725" y="1241425"/>
-            <a:ext cx="4465638" cy="3349625"/>
+            <a:off x="1165225" y="1241425"/>
+            <a:ext cx="4467225" cy="3349625"/>
           </a:xfrm>
           <a:custGeom>
             <a:avLst/>
@@ -2888,8 +3018,8 @@
         </p:nvSpPr>
         <p:spPr>
           <a:xfrm>
-            <a:off x="666909" y="4777194"/>
-            <a:ext cx="5335270" cy="3908614"/>
+            <a:off x="679768" y="4777194"/>
+            <a:ext cx="5438140" cy="3908614"/>
           </a:xfrm>
           <a:prstGeom prst="rect">
             <a:avLst/>
@@ -2985,8 +3115,8 @@
         </p:nvSpPr>
         <p:spPr>
           <a:xfrm>
-            <a:off x="666909" y="4777194"/>
-            <a:ext cx="5335270" cy="3908614"/>
+            <a:off x="679768" y="4777194"/>
+            <a:ext cx="5438140" cy="3908614"/>
           </a:xfrm>
           <a:prstGeom prst="rect">
             <a:avLst/>
@@ -3023,8 +3153,8 @@
         </p:nvSpPr>
         <p:spPr>
           <a:xfrm>
-            <a:off x="1101725" y="1241425"/>
-            <a:ext cx="4465638" cy="3349625"/>
+            <a:off x="1165225" y="1241425"/>
+            <a:ext cx="4467225" cy="3349625"/>
           </a:xfrm>
           <a:custGeom>
             <a:avLst/>
@@ -3119,8 +3249,8 @@
         </p:nvSpPr>
         <p:spPr>
           <a:xfrm>
-            <a:off x="666909" y="4777194"/>
-            <a:ext cx="5335270" cy="3908614"/>
+            <a:off x="679768" y="4777194"/>
+            <a:ext cx="5438140" cy="3908614"/>
           </a:xfrm>
           <a:prstGeom prst="rect">
             <a:avLst/>
@@ -3157,8 +3287,8 @@
         </p:nvSpPr>
         <p:spPr>
           <a:xfrm>
-            <a:off x="1101725" y="1241425"/>
-            <a:ext cx="4465638" cy="3349625"/>
+            <a:off x="1165225" y="1241425"/>
+            <a:ext cx="4467225" cy="3349625"/>
           </a:xfrm>
           <a:custGeom>
             <a:avLst/>
@@ -3253,8 +3383,8 @@
         </p:nvSpPr>
         <p:spPr>
           <a:xfrm>
-            <a:off x="666909" y="4777194"/>
-            <a:ext cx="5335270" cy="3908777"/>
+            <a:off x="679768" y="4777195"/>
+            <a:ext cx="5438140" cy="3908777"/>
           </a:xfrm>
           <a:prstGeom prst="rect">
             <a:avLst/>
@@ -3291,8 +3421,8 @@
         </p:nvSpPr>
         <p:spPr>
           <a:xfrm>
-            <a:off x="1101725" y="1241425"/>
-            <a:ext cx="4465638" cy="3349625"/>
+            <a:off x="1165225" y="1241425"/>
+            <a:ext cx="4467225" cy="3349625"/>
           </a:xfrm>
           <a:custGeom>
             <a:avLst/>
@@ -3387,8 +3517,8 @@
         </p:nvSpPr>
         <p:spPr>
           <a:xfrm>
-            <a:off x="666909" y="4777194"/>
-            <a:ext cx="5335270" cy="3908614"/>
+            <a:off x="679768" y="4777194"/>
+            <a:ext cx="5438140" cy="3908614"/>
           </a:xfrm>
           <a:prstGeom prst="rect">
             <a:avLst/>
@@ -3425,8 +3555,8 @@
         </p:nvSpPr>
         <p:spPr>
           <a:xfrm>
-            <a:off x="1101725" y="1241425"/>
-            <a:ext cx="4465638" cy="3349625"/>
+            <a:off x="1165225" y="1241425"/>
+            <a:ext cx="4467225" cy="3349625"/>
           </a:xfrm>
           <a:custGeom>
             <a:avLst/>
@@ -27848,6 +27978,362 @@
 </p:sld>
 </file>
 
+<file path=ppt/slides/slide37.xml><?xml version="1.0" encoding="utf-8"?>
+<p:sld xmlns:a="http://schemas.openxmlformats.org/drawingml/2006/main" xmlns:r="http://schemas.openxmlformats.org/officeDocument/2006/relationships" xmlns:p="http://schemas.openxmlformats.org/presentationml/2006/main">
+  <p:cSld>
+    <p:spTree>
+      <p:nvGrpSpPr>
+        <p:cNvPr id="1" name=""/>
+        <p:cNvGrpSpPr/>
+        <p:nvPr/>
+      </p:nvGrpSpPr>
+      <p:grpSpPr>
+        <a:xfrm>
+          <a:off x="0" y="0"/>
+          <a:ext cx="0" cy="0"/>
+          <a:chOff x="0" y="0"/>
+          <a:chExt cx="0" cy="0"/>
+        </a:xfrm>
+      </p:grpSpPr>
+      <p:sp>
+        <p:nvSpPr>
+          <p:cNvPr id="5" name="Subtítulo 4">
+            <a:extLst>
+              <a:ext uri="{FF2B5EF4-FFF2-40B4-BE49-F238E27FC236}">
+                <a16:creationId xmlns:a16="http://schemas.microsoft.com/office/drawing/2014/main" id="{7B979F1D-D87F-4E55-9AFF-AC9B2665E015}"/>
+              </a:ext>
+            </a:extLst>
+          </p:cNvPr>
+          <p:cNvSpPr>
+            <a:spLocks noGrp="1"/>
+          </p:cNvSpPr>
+          <p:nvPr>
+            <p:ph type="subTitle" idx="1"/>
+          </p:nvPr>
+        </p:nvSpPr>
+        <p:spPr/>
+        <p:txBody>
+          <a:bodyPr/>
+          <a:lstStyle/>
+          <a:p>
+            <a:r>
+              <a:rPr lang="es-ES" dirty="0"/>
+              <a:t>Seguridad y Transacciones en Base de Datos(Repaso)</a:t>
+            </a:r>
+            <a:endParaRPr lang="es-AR" dirty="0"/>
+          </a:p>
+        </p:txBody>
+      </p:sp>
+      <p:sp>
+        <p:nvSpPr>
+          <p:cNvPr id="4" name="Título 3">
+            <a:extLst>
+              <a:ext uri="{FF2B5EF4-FFF2-40B4-BE49-F238E27FC236}">
+                <a16:creationId xmlns:a16="http://schemas.microsoft.com/office/drawing/2014/main" id="{FE9F4E31-B750-45EB-9012-A6A1077C8F37}"/>
+              </a:ext>
+            </a:extLst>
+          </p:cNvPr>
+          <p:cNvSpPr>
+            <a:spLocks noGrp="1"/>
+          </p:cNvSpPr>
+          <p:nvPr>
+            <p:ph type="ctrTitle"/>
+          </p:nvPr>
+        </p:nvSpPr>
+        <p:spPr/>
+        <p:txBody>
+          <a:bodyPr/>
+          <a:lstStyle/>
+          <a:p>
+            <a:endParaRPr lang="es-AR"/>
+          </a:p>
+        </p:txBody>
+      </p:sp>
+    </p:spTree>
+    <p:extLst>
+      <p:ext uri="{BB962C8B-B14F-4D97-AF65-F5344CB8AC3E}">
+        <p14:creationId xmlns:p14="http://schemas.microsoft.com/office/powerpoint/2010/main" val="3202294854"/>
+      </p:ext>
+    </p:extLst>
+  </p:cSld>
+  <p:clrMapOvr>
+    <a:masterClrMapping/>
+  </p:clrMapOvr>
+</p:sld>
+</file>
+
+<file path=ppt/slides/slide38.xml><?xml version="1.0" encoding="utf-8"?>
+<p:sld xmlns:a="http://schemas.openxmlformats.org/drawingml/2006/main" xmlns:r="http://schemas.openxmlformats.org/officeDocument/2006/relationships" xmlns:p="http://schemas.openxmlformats.org/presentationml/2006/main">
+  <p:cSld>
+    <p:spTree>
+      <p:nvGrpSpPr>
+        <p:cNvPr id="1" name=""/>
+        <p:cNvGrpSpPr/>
+        <p:nvPr/>
+      </p:nvGrpSpPr>
+      <p:grpSpPr>
+        <a:xfrm>
+          <a:off x="0" y="0"/>
+          <a:ext cx="0" cy="0"/>
+          <a:chOff x="0" y="0"/>
+          <a:chExt cx="0" cy="0"/>
+        </a:xfrm>
+      </p:grpSpPr>
+      <p:sp>
+        <p:nvSpPr>
+          <p:cNvPr id="2" name="Título 1">
+            <a:extLst>
+              <a:ext uri="{FF2B5EF4-FFF2-40B4-BE49-F238E27FC236}">
+                <a16:creationId xmlns:a16="http://schemas.microsoft.com/office/drawing/2014/main" id="{2DD0EF7D-9F62-4155-B785-46EF223007D0}"/>
+              </a:ext>
+            </a:extLst>
+          </p:cNvPr>
+          <p:cNvSpPr>
+            <a:spLocks noGrp="1"/>
+          </p:cNvSpPr>
+          <p:nvPr>
+            <p:ph type="title"/>
+          </p:nvPr>
+        </p:nvSpPr>
+        <p:spPr/>
+        <p:txBody>
+          <a:bodyPr/>
+          <a:lstStyle/>
+          <a:p>
+            <a:r>
+              <a:rPr lang="es-ES" dirty="0"/>
+              <a:t>Seguridad en Base de Datos </a:t>
+            </a:r>
+            <a:r>
+              <a:rPr lang="es-ES" sz="3200" dirty="0"/>
+              <a:t>Repaso</a:t>
+            </a:r>
+            <a:endParaRPr lang="es-AR" dirty="0"/>
+          </a:p>
+        </p:txBody>
+      </p:sp>
+      <p:sp>
+        <p:nvSpPr>
+          <p:cNvPr id="3" name="Marcador de texto 2">
+            <a:extLst>
+              <a:ext uri="{FF2B5EF4-FFF2-40B4-BE49-F238E27FC236}">
+                <a16:creationId xmlns:a16="http://schemas.microsoft.com/office/drawing/2014/main" id="{122F90A9-9F7B-4C8B-A191-6A3C2189227F}"/>
+              </a:ext>
+            </a:extLst>
+          </p:cNvPr>
+          <p:cNvSpPr>
+            <a:spLocks noGrp="1"/>
+          </p:cNvSpPr>
+          <p:nvPr>
+            <p:ph type="body" idx="1"/>
+          </p:nvPr>
+        </p:nvSpPr>
+        <p:spPr>
+          <a:xfrm>
+            <a:off x="0" y="1530725"/>
+            <a:ext cx="9144000" cy="4980300"/>
+          </a:xfrm>
+        </p:spPr>
+        <p:txBody>
+          <a:bodyPr/>
+          <a:lstStyle/>
+          <a:p>
+            <a:pPr marL="114300" indent="0">
+              <a:buNone/>
+            </a:pPr>
+            <a:r>
+              <a:rPr lang="es-ES" sz="2400" dirty="0"/>
+              <a:t>• La seguridad se refiere a la protección de los datos contra accesos no autorizados</a:t>
+            </a:r>
+          </a:p>
+          <a:p>
+            <a:pPr marL="114300" indent="0">
+              <a:buNone/>
+            </a:pPr>
+            <a:r>
+              <a:rPr lang="es-ES" sz="2400" dirty="0"/>
+              <a:t>• Diferentes tipos de datos precisan diferentes niveles de seguridad</a:t>
+            </a:r>
+          </a:p>
+          <a:p>
+            <a:pPr marL="114300" indent="0">
+              <a:buNone/>
+            </a:pPr>
+            <a:r>
+              <a:rPr lang="es-ES" sz="2400" dirty="0"/>
+              <a:t>• El costo de la pérdida de los datos determinará el tipo de seguridad requerida</a:t>
+            </a:r>
+          </a:p>
+          <a:p>
+            <a:pPr marL="114300" indent="0">
+              <a:buNone/>
+            </a:pPr>
+            <a:r>
+              <a:rPr lang="es-ES" sz="2400" dirty="0"/>
+              <a:t>• No serán útiles los sistemas de seguridad que impidan el acceso a los datos a un usuario legítimo o de seguridad requerida</a:t>
+            </a:r>
+          </a:p>
+          <a:p>
+            <a:pPr marL="114300" indent="0">
+              <a:buNone/>
+            </a:pPr>
+            <a:r>
+              <a:rPr lang="es-ES" sz="2400" dirty="0"/>
+              <a:t>• El DBMS provee un subsistema de seguridad y autorización de la BD</a:t>
+            </a:r>
+          </a:p>
+          <a:p>
+            <a:pPr marL="114300" indent="0">
+              <a:buNone/>
+            </a:pPr>
+            <a:r>
+              <a:rPr lang="es-ES" sz="2400" dirty="0"/>
+              <a:t>• Para acceder a la BD se requiere una cuenta de usuario y contraseña</a:t>
+            </a:r>
+            <a:endParaRPr lang="es-AR" dirty="0"/>
+          </a:p>
+        </p:txBody>
+      </p:sp>
+    </p:spTree>
+    <p:extLst>
+      <p:ext uri="{BB962C8B-B14F-4D97-AF65-F5344CB8AC3E}">
+        <p14:creationId xmlns:p14="http://schemas.microsoft.com/office/powerpoint/2010/main" val="3863887"/>
+      </p:ext>
+    </p:extLst>
+  </p:cSld>
+  <p:clrMapOvr>
+    <a:masterClrMapping/>
+  </p:clrMapOvr>
+</p:sld>
+</file>
+
+<file path=ppt/slides/slide39.xml><?xml version="1.0" encoding="utf-8"?>
+<p:sld xmlns:a="http://schemas.openxmlformats.org/drawingml/2006/main" xmlns:r="http://schemas.openxmlformats.org/officeDocument/2006/relationships" xmlns:p="http://schemas.openxmlformats.org/presentationml/2006/main">
+  <p:cSld>
+    <p:spTree>
+      <p:nvGrpSpPr>
+        <p:cNvPr id="1" name=""/>
+        <p:cNvGrpSpPr/>
+        <p:nvPr/>
+      </p:nvGrpSpPr>
+      <p:grpSpPr>
+        <a:xfrm>
+          <a:off x="0" y="0"/>
+          <a:ext cx="0" cy="0"/>
+          <a:chOff x="0" y="0"/>
+          <a:chExt cx="0" cy="0"/>
+        </a:xfrm>
+      </p:grpSpPr>
+      <p:sp>
+        <p:nvSpPr>
+          <p:cNvPr id="2" name="Título 1">
+            <a:extLst>
+              <a:ext uri="{FF2B5EF4-FFF2-40B4-BE49-F238E27FC236}">
+                <a16:creationId xmlns:a16="http://schemas.microsoft.com/office/drawing/2014/main" id="{631FA004-ECCA-450E-A6B9-1CCA8883816B}"/>
+              </a:ext>
+            </a:extLst>
+          </p:cNvPr>
+          <p:cNvSpPr>
+            <a:spLocks noGrp="1"/>
+          </p:cNvSpPr>
+          <p:nvPr>
+            <p:ph type="title"/>
+          </p:nvPr>
+        </p:nvSpPr>
+        <p:spPr/>
+        <p:txBody>
+          <a:bodyPr/>
+          <a:lstStyle/>
+          <a:p>
+            <a:r>
+              <a:rPr lang="es-ES" dirty="0"/>
+              <a:t>Seguridad en Base de Datos </a:t>
+            </a:r>
+            <a:r>
+              <a:rPr lang="es-ES" sz="3200" dirty="0"/>
+              <a:t>Repaso</a:t>
+            </a:r>
+            <a:endParaRPr lang="es-AR" dirty="0"/>
+          </a:p>
+        </p:txBody>
+      </p:sp>
+      <p:sp>
+        <p:nvSpPr>
+          <p:cNvPr id="3" name="Marcador de texto 2">
+            <a:extLst>
+              <a:ext uri="{FF2B5EF4-FFF2-40B4-BE49-F238E27FC236}">
+                <a16:creationId xmlns:a16="http://schemas.microsoft.com/office/drawing/2014/main" id="{89F3A02C-5293-4353-9242-B6A55BD3223E}"/>
+              </a:ext>
+            </a:extLst>
+          </p:cNvPr>
+          <p:cNvSpPr>
+            <a:spLocks noGrp="1"/>
+          </p:cNvSpPr>
+          <p:nvPr>
+            <p:ph type="body" idx="1"/>
+          </p:nvPr>
+        </p:nvSpPr>
+        <p:spPr>
+          <a:xfrm>
+            <a:off x="158496" y="1530725"/>
+            <a:ext cx="8985504" cy="4980300"/>
+          </a:xfrm>
+        </p:spPr>
+        <p:txBody>
+          <a:bodyPr/>
+          <a:lstStyle/>
+          <a:p>
+            <a:pPr marL="114300" indent="0">
+              <a:buNone/>
+            </a:pPr>
+            <a:r>
+              <a:rPr lang="es-ES" dirty="0"/>
+              <a:t>• El Administrador de la Base de Datos (DBA) -posee cuenta privilegiada ROOT- debe asegurar una política de acceso clara y consistente:</a:t>
+            </a:r>
+          </a:p>
+          <a:p>
+            <a:pPr marL="114300" indent="0">
+              <a:buNone/>
+            </a:pPr>
+            <a:r>
+              <a:rPr lang="es-ES" dirty="0"/>
+              <a:t>• decidir quién entra a la BD y qué puede hacer sobre los objetos a los que puede acceder (limitado a lo que tienen acceso)</a:t>
+            </a:r>
+          </a:p>
+          <a:p>
+            <a:pPr marL="114300" indent="0">
+              <a:buNone/>
+            </a:pPr>
+            <a:r>
+              <a:rPr lang="es-ES" dirty="0"/>
+              <a:t>• garantizar la seguridad de partes de la BD contra accesos no autorizados(sin derecho de acceso)</a:t>
+            </a:r>
+          </a:p>
+          <a:p>
+            <a:pPr marL="114300" indent="0">
+              <a:buNone/>
+            </a:pPr>
+            <a:r>
+              <a:rPr lang="es-ES" dirty="0"/>
+              <a:t>• no impedir el acceso a los datos por usuarios habilitados (disponibilidad)</a:t>
+            </a:r>
+            <a:endParaRPr lang="es-AR" sz="3200" dirty="0"/>
+          </a:p>
+        </p:txBody>
+      </p:sp>
+    </p:spTree>
+    <p:extLst>
+      <p:ext uri="{BB962C8B-B14F-4D97-AF65-F5344CB8AC3E}">
+        <p14:creationId xmlns:p14="http://schemas.microsoft.com/office/powerpoint/2010/main" val="2487772208"/>
+      </p:ext>
+    </p:extLst>
+  </p:cSld>
+  <p:clrMapOvr>
+    <a:masterClrMapping/>
+  </p:clrMapOvr>
+</p:sld>
+</file>
+
 <file path=ppt/slides/slide4.xml><?xml version="1.0" encoding="utf-8"?>
 <p:sld xmlns:a="http://schemas.openxmlformats.org/drawingml/2006/main" xmlns:r="http://schemas.openxmlformats.org/officeDocument/2006/relationships" xmlns:p="http://schemas.openxmlformats.org/presentationml/2006/main">
   <p:cSld>
@@ -28156,6 +28642,431 @@
     <p:extLst>
       <p:ext uri="{BB962C8B-B14F-4D97-AF65-F5344CB8AC3E}">
         <p14:creationId xmlns:p14="http://schemas.microsoft.com/office/powerpoint/2010/main" val="3372686820"/>
+      </p:ext>
+    </p:extLst>
+  </p:cSld>
+  <p:clrMapOvr>
+    <a:masterClrMapping/>
+  </p:clrMapOvr>
+</p:sld>
+</file>
+
+<file path=ppt/slides/slide40.xml><?xml version="1.0" encoding="utf-8"?>
+<p:sld xmlns:a="http://schemas.openxmlformats.org/drawingml/2006/main" xmlns:r="http://schemas.openxmlformats.org/officeDocument/2006/relationships" xmlns:p="http://schemas.openxmlformats.org/presentationml/2006/main">
+  <p:cSld>
+    <p:spTree>
+      <p:nvGrpSpPr>
+        <p:cNvPr id="1" name=""/>
+        <p:cNvGrpSpPr/>
+        <p:nvPr/>
+      </p:nvGrpSpPr>
+      <p:grpSpPr>
+        <a:xfrm>
+          <a:off x="0" y="0"/>
+          <a:ext cx="0" cy="0"/>
+          <a:chOff x="0" y="0"/>
+          <a:chExt cx="0" cy="0"/>
+        </a:xfrm>
+      </p:grpSpPr>
+      <p:sp>
+        <p:nvSpPr>
+          <p:cNvPr id="2" name="Título 1">
+            <a:extLst>
+              <a:ext uri="{FF2B5EF4-FFF2-40B4-BE49-F238E27FC236}">
+                <a16:creationId xmlns:a16="http://schemas.microsoft.com/office/drawing/2014/main" id="{631FA004-ECCA-450E-A6B9-1CCA8883816B}"/>
+              </a:ext>
+            </a:extLst>
+          </p:cNvPr>
+          <p:cNvSpPr>
+            <a:spLocks noGrp="1"/>
+          </p:cNvSpPr>
+          <p:nvPr>
+            <p:ph type="title"/>
+          </p:nvPr>
+        </p:nvSpPr>
+        <p:spPr/>
+        <p:txBody>
+          <a:bodyPr/>
+          <a:lstStyle/>
+          <a:p>
+            <a:r>
+              <a:rPr lang="es-ES" dirty="0"/>
+              <a:t>Seguridad en Base de Datos </a:t>
+            </a:r>
+            <a:r>
+              <a:rPr lang="es-ES" sz="3200" dirty="0"/>
+              <a:t>Repaso</a:t>
+            </a:r>
+            <a:endParaRPr lang="es-AR" dirty="0"/>
+          </a:p>
+        </p:txBody>
+      </p:sp>
+      <p:sp>
+        <p:nvSpPr>
+          <p:cNvPr id="3" name="Marcador de texto 2">
+            <a:extLst>
+              <a:ext uri="{FF2B5EF4-FFF2-40B4-BE49-F238E27FC236}">
+                <a16:creationId xmlns:a16="http://schemas.microsoft.com/office/drawing/2014/main" id="{89F3A02C-5293-4353-9242-B6A55BD3223E}"/>
+              </a:ext>
+            </a:extLst>
+          </p:cNvPr>
+          <p:cNvSpPr>
+            <a:spLocks noGrp="1"/>
+          </p:cNvSpPr>
+          <p:nvPr>
+            <p:ph type="body" idx="1"/>
+          </p:nvPr>
+        </p:nvSpPr>
+        <p:spPr>
+          <a:xfrm>
+            <a:off x="158496" y="1530725"/>
+            <a:ext cx="8985504" cy="4980300"/>
+          </a:xfrm>
+        </p:spPr>
+        <p:txBody>
+          <a:bodyPr/>
+          <a:lstStyle/>
+          <a:p>
+            <a:pPr marL="114300" indent="0">
+              <a:buNone/>
+            </a:pPr>
+            <a:r>
+              <a:rPr lang="es-ES" sz="2700" dirty="0"/>
+              <a:t>• El acceso a la BD se basa en otorgar y revocar privilegios sobre los objetos de la BD, dando acceso selectivo a otros usuarios (a discreción): </a:t>
+            </a:r>
+          </a:p>
+          <a:p>
+            <a:pPr marL="571500" lvl="1" indent="0">
+              <a:buNone/>
+            </a:pPr>
+            <a:r>
+              <a:rPr lang="es-ES" sz="2700" dirty="0"/>
+              <a:t>• concesión de derechos (GRANT) </a:t>
+            </a:r>
+          </a:p>
+          <a:p>
+            <a:pPr marL="571500" lvl="1" indent="0">
+              <a:buNone/>
+            </a:pPr>
+            <a:r>
+              <a:rPr lang="es-ES" sz="2700" dirty="0"/>
+              <a:t>• revocación de derechos (REVOKE)</a:t>
+            </a:r>
+          </a:p>
+          <a:p>
+            <a:pPr marL="114300" indent="0">
+              <a:buNone/>
+            </a:pPr>
+            <a:r>
+              <a:rPr lang="es-ES" sz="2700" dirty="0"/>
+              <a:t>• Una transacción es una unidad lógica de trabajo atómica</a:t>
+            </a:r>
+          </a:p>
+          <a:p>
+            <a:pPr marL="114300" indent="0">
+              <a:buNone/>
+            </a:pPr>
+            <a:r>
+              <a:rPr lang="es-ES" sz="2700" dirty="0"/>
+              <a:t>• No hay una sentencia explícita de inicio, implícitamente comienza por una sentencia SQL</a:t>
+            </a:r>
+          </a:p>
+          <a:p>
+            <a:pPr marL="114300" indent="0">
+              <a:buNone/>
+            </a:pPr>
+            <a:r>
+              <a:rPr lang="es-ES" sz="2700" dirty="0"/>
+              <a:t>• Finalización: con COMMIT o ROLLBACK • Cada transacción tiene ciertas características, que se pueden especificar en la sentencia SET TRANSACTION</a:t>
+            </a:r>
+            <a:endParaRPr lang="es-AR" sz="2700" dirty="0"/>
+          </a:p>
+        </p:txBody>
+      </p:sp>
+    </p:spTree>
+    <p:extLst>
+      <p:ext uri="{BB962C8B-B14F-4D97-AF65-F5344CB8AC3E}">
+        <p14:creationId xmlns:p14="http://schemas.microsoft.com/office/powerpoint/2010/main" val="85516487"/>
+      </p:ext>
+    </p:extLst>
+  </p:cSld>
+  <p:clrMapOvr>
+    <a:masterClrMapping/>
+  </p:clrMapOvr>
+</p:sld>
+</file>
+
+<file path=ppt/slides/slide41.xml><?xml version="1.0" encoding="utf-8"?>
+<p:sld xmlns:a="http://schemas.openxmlformats.org/drawingml/2006/main" xmlns:r="http://schemas.openxmlformats.org/officeDocument/2006/relationships" xmlns:p="http://schemas.openxmlformats.org/presentationml/2006/main">
+  <p:cSld>
+    <p:spTree>
+      <p:nvGrpSpPr>
+        <p:cNvPr id="1" name=""/>
+        <p:cNvGrpSpPr/>
+        <p:nvPr/>
+      </p:nvGrpSpPr>
+      <p:grpSpPr>
+        <a:xfrm>
+          <a:off x="0" y="0"/>
+          <a:ext cx="0" cy="0"/>
+          <a:chOff x="0" y="0"/>
+          <a:chExt cx="0" cy="0"/>
+        </a:xfrm>
+      </p:grpSpPr>
+      <p:sp>
+        <p:nvSpPr>
+          <p:cNvPr id="2" name="Título 1">
+            <a:extLst>
+              <a:ext uri="{FF2B5EF4-FFF2-40B4-BE49-F238E27FC236}">
+                <a16:creationId xmlns:a16="http://schemas.microsoft.com/office/drawing/2014/main" id="{43A1F752-EEE1-4CD4-8338-37C5934A7DB3}"/>
+              </a:ext>
+            </a:extLst>
+          </p:cNvPr>
+          <p:cNvSpPr>
+            <a:spLocks noGrp="1"/>
+          </p:cNvSpPr>
+          <p:nvPr>
+            <p:ph type="title"/>
+          </p:nvPr>
+        </p:nvSpPr>
+        <p:spPr/>
+        <p:txBody>
+          <a:bodyPr/>
+          <a:lstStyle/>
+          <a:p>
+            <a:r>
+              <a:rPr lang="es-AR" dirty="0"/>
+              <a:t>SQL Procedural </a:t>
+            </a:r>
+            <a:br>
+              <a:rPr lang="es-AR" dirty="0"/>
+            </a:br>
+            <a:r>
+              <a:rPr lang="es-AR" sz="2800" dirty="0"/>
+              <a:t>Repaso</a:t>
+            </a:r>
+            <a:endParaRPr lang="es-AR" dirty="0"/>
+          </a:p>
+        </p:txBody>
+      </p:sp>
+      <p:sp>
+        <p:nvSpPr>
+          <p:cNvPr id="3" name="Marcador de texto 2">
+            <a:extLst>
+              <a:ext uri="{FF2B5EF4-FFF2-40B4-BE49-F238E27FC236}">
+                <a16:creationId xmlns:a16="http://schemas.microsoft.com/office/drawing/2014/main" id="{882004BF-125C-4B87-9835-69C373F2C8E2}"/>
+              </a:ext>
+            </a:extLst>
+          </p:cNvPr>
+          <p:cNvSpPr>
+            <a:spLocks noGrp="1"/>
+          </p:cNvSpPr>
+          <p:nvPr>
+            <p:ph type="body" idx="1"/>
+          </p:nvPr>
+        </p:nvSpPr>
+        <p:spPr/>
+        <p:txBody>
+          <a:bodyPr/>
+          <a:lstStyle/>
+          <a:p>
+            <a:pPr marL="114300" indent="0">
+              <a:buNone/>
+            </a:pPr>
+            <a:r>
+              <a:rPr lang="es-ES" sz="2900" dirty="0"/>
+              <a:t>• </a:t>
+            </a:r>
+            <a:r>
+              <a:rPr lang="es-ES" sz="2900" dirty="0" err="1"/>
+              <a:t>Trigger</a:t>
+            </a:r>
+            <a:r>
+              <a:rPr lang="es-ES" sz="2900" dirty="0"/>
+              <a:t>: Es un procedimiento que es invocado automáticamente por el DBMS en respuesta a un evento específico de la Base de Datos</a:t>
+            </a:r>
+          </a:p>
+          <a:p>
+            <a:pPr marL="114300" indent="0">
+              <a:buNone/>
+            </a:pPr>
+            <a:r>
+              <a:rPr lang="es-ES" sz="2900" dirty="0"/>
+              <a:t>• </a:t>
+            </a:r>
+            <a:r>
+              <a:rPr lang="es-ES" sz="2900" dirty="0" err="1"/>
+              <a:t>Stored</a:t>
+            </a:r>
+            <a:r>
+              <a:rPr lang="es-ES" sz="2900" dirty="0"/>
+              <a:t> </a:t>
+            </a:r>
+            <a:r>
+              <a:rPr lang="es-ES" sz="2900" dirty="0" err="1"/>
+              <a:t>Procedure</a:t>
+            </a:r>
+            <a:r>
+              <a:rPr lang="es-ES" sz="2900" dirty="0"/>
+              <a:t>: Es un procedimiento que es invocado explícitamente por el usuario</a:t>
+            </a:r>
+          </a:p>
+          <a:p>
+            <a:pPr marL="114300" indent="0">
+              <a:buNone/>
+            </a:pPr>
+            <a:r>
+              <a:rPr lang="es-ES" sz="2900" dirty="0"/>
+              <a:t>• Función: Puede ser predefinida o definida por el usuario para realizar operaciones específicas sobre los datos, y pueden ser invocadas desde un </a:t>
+            </a:r>
+            <a:r>
+              <a:rPr lang="es-ES" sz="2900" dirty="0" err="1"/>
+              <a:t>trigger</a:t>
+            </a:r>
+            <a:r>
+              <a:rPr lang="es-ES" sz="2900" dirty="0"/>
+              <a:t>, </a:t>
+            </a:r>
+            <a:r>
+              <a:rPr lang="es-ES" sz="2900" dirty="0" err="1"/>
+              <a:t>stored</a:t>
+            </a:r>
+            <a:r>
+              <a:rPr lang="es-ES" sz="2900" dirty="0"/>
+              <a:t> </a:t>
+            </a:r>
+            <a:r>
+              <a:rPr lang="es-ES" sz="2900" dirty="0" err="1"/>
+              <a:t>procedure</a:t>
+            </a:r>
+            <a:r>
+              <a:rPr lang="es-ES" sz="2900" dirty="0"/>
+              <a:t> o explícitamente</a:t>
+            </a:r>
+            <a:endParaRPr lang="es-AR" sz="2900" dirty="0"/>
+          </a:p>
+        </p:txBody>
+      </p:sp>
+    </p:spTree>
+    <p:extLst>
+      <p:ext uri="{BB962C8B-B14F-4D97-AF65-F5344CB8AC3E}">
+        <p14:creationId xmlns:p14="http://schemas.microsoft.com/office/powerpoint/2010/main" val="3366639090"/>
+      </p:ext>
+    </p:extLst>
+  </p:cSld>
+  <p:clrMapOvr>
+    <a:masterClrMapping/>
+  </p:clrMapOvr>
+</p:sld>
+</file>
+
+<file path=ppt/slides/slide42.xml><?xml version="1.0" encoding="utf-8"?>
+<p:sld xmlns:a="http://schemas.openxmlformats.org/drawingml/2006/main" xmlns:r="http://schemas.openxmlformats.org/officeDocument/2006/relationships" xmlns:p="http://schemas.openxmlformats.org/presentationml/2006/main">
+  <p:cSld>
+    <p:spTree>
+      <p:nvGrpSpPr>
+        <p:cNvPr id="1" name=""/>
+        <p:cNvGrpSpPr/>
+        <p:nvPr/>
+      </p:nvGrpSpPr>
+      <p:grpSpPr>
+        <a:xfrm>
+          <a:off x="0" y="0"/>
+          <a:ext cx="0" cy="0"/>
+          <a:chOff x="0" y="0"/>
+          <a:chExt cx="0" cy="0"/>
+        </a:xfrm>
+      </p:grpSpPr>
+      <p:sp>
+        <p:nvSpPr>
+          <p:cNvPr id="2" name="Título 1">
+            <a:extLst>
+              <a:ext uri="{FF2B5EF4-FFF2-40B4-BE49-F238E27FC236}">
+                <a16:creationId xmlns:a16="http://schemas.microsoft.com/office/drawing/2014/main" id="{350267C8-0436-4000-8113-E471742881AF}"/>
+              </a:ext>
+            </a:extLst>
+          </p:cNvPr>
+          <p:cNvSpPr>
+            <a:spLocks noGrp="1"/>
+          </p:cNvSpPr>
+          <p:nvPr>
+            <p:ph type="title"/>
+          </p:nvPr>
+        </p:nvSpPr>
+        <p:spPr/>
+        <p:txBody>
+          <a:bodyPr/>
+          <a:lstStyle/>
+          <a:p>
+            <a:r>
+              <a:rPr lang="es-AR" dirty="0"/>
+              <a:t>Vistas en SQL </a:t>
+            </a:r>
+            <a:br>
+              <a:rPr lang="es-AR" dirty="0"/>
+            </a:br>
+            <a:r>
+              <a:rPr lang="es-AR" sz="3200" dirty="0"/>
+              <a:t>Repaso</a:t>
+            </a:r>
+            <a:endParaRPr lang="es-AR" dirty="0"/>
+          </a:p>
+        </p:txBody>
+      </p:sp>
+      <p:sp>
+        <p:nvSpPr>
+          <p:cNvPr id="3" name="Marcador de texto 2">
+            <a:extLst>
+              <a:ext uri="{FF2B5EF4-FFF2-40B4-BE49-F238E27FC236}">
+                <a16:creationId xmlns:a16="http://schemas.microsoft.com/office/drawing/2014/main" id="{EB97C7B1-DB98-4D63-AFCB-7C049ABC4009}"/>
+              </a:ext>
+            </a:extLst>
+          </p:cNvPr>
+          <p:cNvSpPr>
+            <a:spLocks noGrp="1"/>
+          </p:cNvSpPr>
+          <p:nvPr>
+            <p:ph type="body" idx="1"/>
+          </p:nvPr>
+        </p:nvSpPr>
+        <p:spPr/>
+        <p:txBody>
+          <a:bodyPr/>
+          <a:lstStyle/>
+          <a:p>
+            <a:pPr marL="114300" indent="0">
+              <a:buNone/>
+            </a:pPr>
+            <a:r>
+              <a:rPr lang="es-ES" sz="3200" dirty="0"/>
+              <a:t>• Tabla virtual (habitualmente no materializada) donde las filas se generan al operar sobre la vista, según su definición (no necesariamente existen en forma física)</a:t>
+            </a:r>
+          </a:p>
+          <a:p>
+            <a:pPr marL="114300" indent="0">
+              <a:buNone/>
+            </a:pPr>
+            <a:r>
+              <a:rPr lang="es-ES" sz="3200" dirty="0"/>
+              <a:t>• Relación derivada que se define dando un nombre a una expresión de consulta</a:t>
+            </a:r>
+          </a:p>
+          <a:p>
+            <a:pPr marL="114300" indent="0">
+              <a:buNone/>
+            </a:pPr>
+            <a:r>
+              <a:rPr lang="es-ES" sz="3200" dirty="0"/>
+              <a:t>• Su contenido está definido como una consulta sobre una o más tablas (u otras vistas)</a:t>
+            </a:r>
+            <a:endParaRPr lang="es-AR" sz="3200" dirty="0"/>
+          </a:p>
+        </p:txBody>
+      </p:sp>
+    </p:spTree>
+    <p:extLst>
+      <p:ext uri="{BB962C8B-B14F-4D97-AF65-F5344CB8AC3E}">
+        <p14:creationId xmlns:p14="http://schemas.microsoft.com/office/powerpoint/2010/main" val="508416367"/>
       </p:ext>
     </p:extLst>
   </p:cSld>

</xml_diff>